<commit_message>
add hashviz slide to the visualization section
</commit_message>
<xml_diff>
--- a/slides/pptx/6-visualisation.pptx
+++ b/slides/pptx/6-visualisation.pptx
@@ -5,7 +5,7 @@
     <p:sldMasterId id="2147483660" r:id="rId1"/>
   </p:sldMasterIdLst>
   <p:notesMasterIdLst>
-    <p:notesMasterId r:id="rId9"/>
+    <p:notesMasterId r:id="rId10"/>
   </p:notesMasterIdLst>
   <p:sldIdLst>
     <p:sldId id="366" r:id="rId2"/>
@@ -14,7 +14,8 @@
     <p:sldId id="374" r:id="rId5"/>
     <p:sldId id="375" r:id="rId6"/>
     <p:sldId id="376" r:id="rId7"/>
-    <p:sldId id="378" r:id="rId8"/>
+    <p:sldId id="379" r:id="rId8"/>
+    <p:sldId id="378" r:id="rId9"/>
   </p:sldIdLst>
   <p:sldSz cx="9144000" cy="6858000" type="screen4x3"/>
   <p:notesSz cx="6858000" cy="9144000"/>
@@ -212,7 +213,7 @@
           <a:p>
             <a:fld id="{BE1256C8-1BA4-4200-90F3-9413893DDEA5}" type="datetimeFigureOut">
               <a:rPr lang="en-US" smtClean="0"/>
-              <a:t>4/9/2018</a:t>
+              <a:t>4/18/18</a:t>
             </a:fld>
             <a:endParaRPr lang="en-US"/>
           </a:p>
@@ -479,6 +480,93 @@
 </p:notesMaster>
 </file>
 
+<file path=ppt/notesSlides/notesSlide1.xml><?xml version="1.0" encoding="utf-8"?>
+<p:notes xmlns:a="http://schemas.openxmlformats.org/drawingml/2006/main" xmlns:r="http://schemas.openxmlformats.org/officeDocument/2006/relationships" xmlns:p="http://schemas.openxmlformats.org/presentationml/2006/main">
+  <p:cSld>
+    <p:spTree>
+      <p:nvGrpSpPr>
+        <p:cNvPr id="1" name=""/>
+        <p:cNvGrpSpPr/>
+        <p:nvPr/>
+      </p:nvGrpSpPr>
+      <p:grpSpPr>
+        <a:xfrm>
+          <a:off x="0" y="0"/>
+          <a:ext cx="0" cy="0"/>
+          <a:chOff x="0" y="0"/>
+          <a:chExt cx="0" cy="0"/>
+        </a:xfrm>
+      </p:grpSpPr>
+      <p:sp>
+        <p:nvSpPr>
+          <p:cNvPr id="2" name="Slide Image Placeholder 1"/>
+          <p:cNvSpPr>
+            <a:spLocks noGrp="1" noRot="1" noChangeAspect="1"/>
+          </p:cNvSpPr>
+          <p:nvPr>
+            <p:ph type="sldImg"/>
+          </p:nvPr>
+        </p:nvSpPr>
+        <p:spPr/>
+      </p:sp>
+      <p:sp>
+        <p:nvSpPr>
+          <p:cNvPr id="3" name="Notes Placeholder 2"/>
+          <p:cNvSpPr>
+            <a:spLocks noGrp="1"/>
+          </p:cNvSpPr>
+          <p:nvPr>
+            <p:ph type="body" idx="1"/>
+          </p:nvPr>
+        </p:nvSpPr>
+        <p:spPr/>
+        <p:txBody>
+          <a:bodyPr/>
+          <a:lstStyle/>
+          <a:p>
+            <a:r>
+              <a:rPr lang="en-US"/>
+              <a:t>Hashviz notebook</a:t>
+            </a:r>
+          </a:p>
+        </p:txBody>
+      </p:sp>
+      <p:sp>
+        <p:nvSpPr>
+          <p:cNvPr id="4" name="Slide Number Placeholder 3"/>
+          <p:cNvSpPr>
+            <a:spLocks noGrp="1"/>
+          </p:cNvSpPr>
+          <p:nvPr>
+            <p:ph type="sldNum" sz="quarter" idx="10"/>
+          </p:nvPr>
+        </p:nvSpPr>
+        <p:spPr/>
+        <p:txBody>
+          <a:bodyPr/>
+          <a:lstStyle/>
+          <a:p>
+            <a:fld id="{9D3E0FAC-92B7-4344-B8CE-D78B9752AB0B}" type="slidenum">
+              <a:rPr lang="en-US" smtClean="0"/>
+              <a:t>7</a:t>
+            </a:fld>
+            <a:endParaRPr lang="en-US"/>
+          </a:p>
+        </p:txBody>
+      </p:sp>
+    </p:spTree>
+    <p:extLst>
+      <p:ext uri="{BB962C8B-B14F-4D97-AF65-F5344CB8AC3E}">
+        <p14:creationId xmlns:p14="http://schemas.microsoft.com/office/powerpoint/2010/main" val="429555041"/>
+      </p:ext>
+    </p:extLst>
+  </p:cSld>
+  <p:clrMapOvr>
+    <a:masterClrMapping/>
+  </p:clrMapOvr>
+</p:notes>
+</file>
+
 <file path=ppt/slideLayouts/slideLayout1.xml><?xml version="1.0" encoding="utf-8"?>
 <p:sldLayout xmlns:a="http://schemas.openxmlformats.org/drawingml/2006/main" xmlns:r="http://schemas.openxmlformats.org/officeDocument/2006/relationships" xmlns:p="http://schemas.openxmlformats.org/presentationml/2006/main" type="title" preserve="1">
   <p:cSld name="Title Slide">
@@ -610,7 +698,7 @@
           <a:p>
             <a:fld id="{7CC7A2F6-2F19-4AE6-AE33-E09CFF174DCA}" type="datetimeFigureOut">
               <a:rPr lang="en-GB" smtClean="0"/>
-              <a:t>09/04/2018</a:t>
+              <a:t>18/04/2018</a:t>
             </a:fld>
             <a:endParaRPr lang="en-GB"/>
           </a:p>
@@ -780,7 +868,7 @@
           <a:p>
             <a:fld id="{7CC7A2F6-2F19-4AE6-AE33-E09CFF174DCA}" type="datetimeFigureOut">
               <a:rPr lang="en-GB" smtClean="0"/>
-              <a:t>09/04/2018</a:t>
+              <a:t>18/04/2018</a:t>
             </a:fld>
             <a:endParaRPr lang="en-GB"/>
           </a:p>
@@ -960,7 +1048,7 @@
           <a:p>
             <a:fld id="{7CC7A2F6-2F19-4AE6-AE33-E09CFF174DCA}" type="datetimeFigureOut">
               <a:rPr lang="en-GB" smtClean="0"/>
-              <a:t>09/04/2018</a:t>
+              <a:t>18/04/2018</a:t>
             </a:fld>
             <a:endParaRPr lang="en-GB"/>
           </a:p>
@@ -1130,7 +1218,7 @@
           <a:p>
             <a:fld id="{7CC7A2F6-2F19-4AE6-AE33-E09CFF174DCA}" type="datetimeFigureOut">
               <a:rPr lang="en-GB" smtClean="0"/>
-              <a:t>09/04/2018</a:t>
+              <a:t>18/04/2018</a:t>
             </a:fld>
             <a:endParaRPr lang="en-GB"/>
           </a:p>
@@ -1374,7 +1462,7 @@
           <a:p>
             <a:fld id="{7CC7A2F6-2F19-4AE6-AE33-E09CFF174DCA}" type="datetimeFigureOut">
               <a:rPr lang="en-GB" smtClean="0"/>
-              <a:t>09/04/2018</a:t>
+              <a:t>18/04/2018</a:t>
             </a:fld>
             <a:endParaRPr lang="en-GB"/>
           </a:p>
@@ -1606,7 +1694,7 @@
           <a:p>
             <a:fld id="{7CC7A2F6-2F19-4AE6-AE33-E09CFF174DCA}" type="datetimeFigureOut">
               <a:rPr lang="en-GB" smtClean="0"/>
-              <a:t>09/04/2018</a:t>
+              <a:t>18/04/2018</a:t>
             </a:fld>
             <a:endParaRPr lang="en-GB"/>
           </a:p>
@@ -1973,7 +2061,7 @@
           <a:p>
             <a:fld id="{7CC7A2F6-2F19-4AE6-AE33-E09CFF174DCA}" type="datetimeFigureOut">
               <a:rPr lang="en-GB" smtClean="0"/>
-              <a:t>09/04/2018</a:t>
+              <a:t>18/04/2018</a:t>
             </a:fld>
             <a:endParaRPr lang="en-GB"/>
           </a:p>
@@ -2091,7 +2179,7 @@
           <a:p>
             <a:fld id="{7CC7A2F6-2F19-4AE6-AE33-E09CFF174DCA}" type="datetimeFigureOut">
               <a:rPr lang="en-GB" smtClean="0"/>
-              <a:t>09/04/2018</a:t>
+              <a:t>18/04/2018</a:t>
             </a:fld>
             <a:endParaRPr lang="en-GB"/>
           </a:p>
@@ -2186,7 +2274,7 @@
           <a:p>
             <a:fld id="{7CC7A2F6-2F19-4AE6-AE33-E09CFF174DCA}" type="datetimeFigureOut">
               <a:rPr lang="en-GB" smtClean="0"/>
-              <a:t>09/04/2018</a:t>
+              <a:t>18/04/2018</a:t>
             </a:fld>
             <a:endParaRPr lang="en-GB"/>
           </a:p>
@@ -2463,7 +2551,7 @@
           <a:p>
             <a:fld id="{7CC7A2F6-2F19-4AE6-AE33-E09CFF174DCA}" type="datetimeFigureOut">
               <a:rPr lang="en-GB" smtClean="0"/>
-              <a:t>09/04/2018</a:t>
+              <a:t>18/04/2018</a:t>
             </a:fld>
             <a:endParaRPr lang="en-GB"/>
           </a:p>
@@ -2720,7 +2808,7 @@
           <a:p>
             <a:fld id="{7CC7A2F6-2F19-4AE6-AE33-E09CFF174DCA}" type="datetimeFigureOut">
               <a:rPr lang="en-GB" smtClean="0"/>
-              <a:t>09/04/2018</a:t>
+              <a:t>18/04/2018</a:t>
             </a:fld>
             <a:endParaRPr lang="en-GB"/>
           </a:p>
@@ -2933,7 +3021,7 @@
           <a:p>
             <a:fld id="{7CC7A2F6-2F19-4AE6-AE33-E09CFF174DCA}" type="datetimeFigureOut">
               <a:rPr lang="en-GB" smtClean="0"/>
-              <a:t>09/04/2018</a:t>
+              <a:t>18/04/2018</a:t>
             </a:fld>
             <a:endParaRPr lang="en-GB"/>
           </a:p>
@@ -4208,7 +4296,7 @@
           <p:cNvPr id="2" name="Title 1">
             <a:extLst>
               <a:ext uri="{FF2B5EF4-FFF2-40B4-BE49-F238E27FC236}">
-                <a16:creationId xmlns:a16="http://schemas.microsoft.com/office/drawing/2014/main" xmlns="" id="{EE6FA740-88C2-4438-BE74-8C45FDCFD8D6}"/>
+                <a16:creationId xmlns="" xmlns:a16="http://schemas.microsoft.com/office/drawing/2014/main" id="{EE6FA740-88C2-4438-BE74-8C45FDCFD8D6}"/>
               </a:ext>
             </a:extLst>
           </p:cNvPr>
@@ -4315,7 +4403,7 @@
           <p:cNvPr id="2" name="Title 1">
             <a:extLst>
               <a:ext uri="{FF2B5EF4-FFF2-40B4-BE49-F238E27FC236}">
-                <a16:creationId xmlns:a16="http://schemas.microsoft.com/office/drawing/2014/main" xmlns="" id="{EE6FA740-88C2-4438-BE74-8C45FDCFD8D6}"/>
+                <a16:creationId xmlns="" xmlns:a16="http://schemas.microsoft.com/office/drawing/2014/main" id="{EE6FA740-88C2-4438-BE74-8C45FDCFD8D6}"/>
               </a:ext>
             </a:extLst>
           </p:cNvPr>
@@ -4411,7 +4499,7 @@
           <p:cNvPr id="2" name="Title 1">
             <a:extLst>
               <a:ext uri="{FF2B5EF4-FFF2-40B4-BE49-F238E27FC236}">
-                <a16:creationId xmlns:a16="http://schemas.microsoft.com/office/drawing/2014/main" xmlns="" id="{EE6FA740-88C2-4438-BE74-8C45FDCFD8D6}"/>
+                <a16:creationId xmlns="" xmlns:a16="http://schemas.microsoft.com/office/drawing/2014/main" id="{EE6FA740-88C2-4438-BE74-8C45FDCFD8D6}"/>
               </a:ext>
             </a:extLst>
           </p:cNvPr>
@@ -4541,7 +4629,7 @@
           <p:cNvPr id="2" name="Title 1">
             <a:extLst>
               <a:ext uri="{FF2B5EF4-FFF2-40B4-BE49-F238E27FC236}">
-                <a16:creationId xmlns:a16="http://schemas.microsoft.com/office/drawing/2014/main" xmlns="" id="{EE6FA740-88C2-4438-BE74-8C45FDCFD8D6}"/>
+                <a16:creationId xmlns="" xmlns:a16="http://schemas.microsoft.com/office/drawing/2014/main" id="{EE6FA740-88C2-4438-BE74-8C45FDCFD8D6}"/>
               </a:ext>
             </a:extLst>
           </p:cNvPr>
@@ -4667,7 +4755,7 @@
           <p:cNvPr id="2" name="Title 1">
             <a:extLst>
               <a:ext uri="{FF2B5EF4-FFF2-40B4-BE49-F238E27FC236}">
-                <a16:creationId xmlns:a16="http://schemas.microsoft.com/office/drawing/2014/main" xmlns="" id="{EE6FA740-88C2-4438-BE74-8C45FDCFD8D6}"/>
+                <a16:creationId xmlns="" xmlns:a16="http://schemas.microsoft.com/office/drawing/2014/main" id="{EE6FA740-88C2-4438-BE74-8C45FDCFD8D6}"/>
               </a:ext>
             </a:extLst>
           </p:cNvPr>
@@ -4772,6 +4860,121 @@
 </file>
 
 <file path=ppt/slides/slide7.xml><?xml version="1.0" encoding="utf-8"?>
+<p:sld xmlns:a="http://schemas.openxmlformats.org/drawingml/2006/main" xmlns:r="http://schemas.openxmlformats.org/officeDocument/2006/relationships" xmlns:p="http://schemas.openxmlformats.org/presentationml/2006/main">
+  <p:cSld>
+    <p:spTree>
+      <p:nvGrpSpPr>
+        <p:cNvPr id="1" name=""/>
+        <p:cNvGrpSpPr/>
+        <p:nvPr/>
+      </p:nvGrpSpPr>
+      <p:grpSpPr>
+        <a:xfrm>
+          <a:off x="0" y="0"/>
+          <a:ext cx="0" cy="0"/>
+          <a:chOff x="0" y="0"/>
+          <a:chExt cx="0" cy="0"/>
+        </a:xfrm>
+      </p:grpSpPr>
+      <p:sp>
+        <p:nvSpPr>
+          <p:cNvPr id="2" name="Title 1"/>
+          <p:cNvSpPr>
+            <a:spLocks noGrp="1"/>
+          </p:cNvSpPr>
+          <p:nvPr>
+            <p:ph type="title"/>
+          </p:nvPr>
+        </p:nvSpPr>
+        <p:spPr/>
+        <p:txBody>
+          <a:bodyPr/>
+          <a:lstStyle/>
+          <a:p>
+            <a:r>
+              <a:rPr lang="en-US"/>
+              <a:t>HashViz</a:t>
+            </a:r>
+          </a:p>
+        </p:txBody>
+      </p:sp>
+      <p:sp>
+        <p:nvSpPr>
+          <p:cNvPr id="3" name="Content Placeholder 2"/>
+          <p:cNvSpPr>
+            <a:spLocks noGrp="1"/>
+          </p:cNvSpPr>
+          <p:nvPr>
+            <p:ph idx="1"/>
+          </p:nvPr>
+        </p:nvSpPr>
+        <p:spPr/>
+        <p:txBody>
+          <a:bodyPr/>
+          <a:lstStyle/>
+          <a:p>
+            <a:r>
+              <a:rPr lang="en-US"/>
+              <a:t>Hashtags contain a lot of important semantic information explicitly tagged by users</a:t>
+            </a:r>
+          </a:p>
+          <a:p>
+            <a:r>
+              <a:rPr lang="en-US"/>
+              <a:t>How do we visualize and ‘play with’ hashtags from an arbitrary multi-million tweet corpus collected in the aftermath of the disaster?</a:t>
+            </a:r>
+          </a:p>
+        </p:txBody>
+      </p:sp>
+      <p:sp>
+        <p:nvSpPr>
+          <p:cNvPr id="4" name="TextBox 3"/>
+          <p:cNvSpPr txBox="1"/>
+          <p:nvPr/>
+        </p:nvSpPr>
+        <p:spPr>
+          <a:xfrm>
+            <a:off x="3853694" y="4918364"/>
+            <a:ext cx="1436612" cy="707886"/>
+          </a:xfrm>
+          <a:prstGeom prst="rect">
+            <a:avLst/>
+          </a:prstGeom>
+          <a:noFill/>
+        </p:spPr>
+        <p:txBody>
+          <a:bodyPr wrap="none" rtlCol="0">
+            <a:spAutoFit/>
+          </a:bodyPr>
+          <a:lstStyle/>
+          <a:p>
+            <a:r>
+              <a:rPr lang="en-US" sz="4000">
+                <a:solidFill>
+                  <a:schemeClr val="accent6">
+                    <a:lumMod val="50000"/>
+                  </a:schemeClr>
+                </a:solidFill>
+              </a:rPr>
+              <a:t>Demo</a:t>
+            </a:r>
+          </a:p>
+        </p:txBody>
+      </p:sp>
+    </p:spTree>
+    <p:extLst>
+      <p:ext uri="{BB962C8B-B14F-4D97-AF65-F5344CB8AC3E}">
+        <p14:creationId xmlns:p14="http://schemas.microsoft.com/office/powerpoint/2010/main" val="1899650429"/>
+      </p:ext>
+    </p:extLst>
+  </p:cSld>
+  <p:clrMapOvr>
+    <a:masterClrMapping/>
+  </p:clrMapOvr>
+</p:sld>
+</file>
+
+<file path=ppt/slides/slide8.xml><?xml version="1.0" encoding="utf-8"?>
 <p:sld xmlns:a="http://schemas.openxmlformats.org/drawingml/2006/main" xmlns:r="http://schemas.openxmlformats.org/officeDocument/2006/relationships" xmlns:p="http://schemas.openxmlformats.org/presentationml/2006/main">
   <p:cSld>
     <p:spTree>

</xml_diff>

<commit_message>
visualization provide details on thor
</commit_message>
<xml_diff>
--- a/slides/pptx/6-visualisation.pptx
+++ b/slides/pptx/6-visualisation.pptx
@@ -213,7 +213,7 @@
           <a:p>
             <a:fld id="{BE1256C8-1BA4-4200-90F3-9413893DDEA5}" type="datetimeFigureOut">
               <a:rPr lang="en-US" smtClean="0"/>
-              <a:t>4/18/18</a:t>
+              <a:t>4/19/18</a:t>
             </a:fld>
             <a:endParaRPr lang="en-US"/>
           </a:p>
@@ -698,7 +698,7 @@
           <a:p>
             <a:fld id="{7CC7A2F6-2F19-4AE6-AE33-E09CFF174DCA}" type="datetimeFigureOut">
               <a:rPr lang="en-GB" smtClean="0"/>
-              <a:t>18/04/2018</a:t>
+              <a:t>19/04/2018</a:t>
             </a:fld>
             <a:endParaRPr lang="en-GB"/>
           </a:p>
@@ -868,7 +868,7 @@
           <a:p>
             <a:fld id="{7CC7A2F6-2F19-4AE6-AE33-E09CFF174DCA}" type="datetimeFigureOut">
               <a:rPr lang="en-GB" smtClean="0"/>
-              <a:t>18/04/2018</a:t>
+              <a:t>19/04/2018</a:t>
             </a:fld>
             <a:endParaRPr lang="en-GB"/>
           </a:p>
@@ -1048,7 +1048,7 @@
           <a:p>
             <a:fld id="{7CC7A2F6-2F19-4AE6-AE33-E09CFF174DCA}" type="datetimeFigureOut">
               <a:rPr lang="en-GB" smtClean="0"/>
-              <a:t>18/04/2018</a:t>
+              <a:t>19/04/2018</a:t>
             </a:fld>
             <a:endParaRPr lang="en-GB"/>
           </a:p>
@@ -1218,7 +1218,7 @@
           <a:p>
             <a:fld id="{7CC7A2F6-2F19-4AE6-AE33-E09CFF174DCA}" type="datetimeFigureOut">
               <a:rPr lang="en-GB" smtClean="0"/>
-              <a:t>18/04/2018</a:t>
+              <a:t>19/04/2018</a:t>
             </a:fld>
             <a:endParaRPr lang="en-GB"/>
           </a:p>
@@ -1462,7 +1462,7 @@
           <a:p>
             <a:fld id="{7CC7A2F6-2F19-4AE6-AE33-E09CFF174DCA}" type="datetimeFigureOut">
               <a:rPr lang="en-GB" smtClean="0"/>
-              <a:t>18/04/2018</a:t>
+              <a:t>19/04/2018</a:t>
             </a:fld>
             <a:endParaRPr lang="en-GB"/>
           </a:p>
@@ -1694,7 +1694,7 @@
           <a:p>
             <a:fld id="{7CC7A2F6-2F19-4AE6-AE33-E09CFF174DCA}" type="datetimeFigureOut">
               <a:rPr lang="en-GB" smtClean="0"/>
-              <a:t>18/04/2018</a:t>
+              <a:t>19/04/2018</a:t>
             </a:fld>
             <a:endParaRPr lang="en-GB"/>
           </a:p>
@@ -2061,7 +2061,7 @@
           <a:p>
             <a:fld id="{7CC7A2F6-2F19-4AE6-AE33-E09CFF174DCA}" type="datetimeFigureOut">
               <a:rPr lang="en-GB" smtClean="0"/>
-              <a:t>18/04/2018</a:t>
+              <a:t>19/04/2018</a:t>
             </a:fld>
             <a:endParaRPr lang="en-GB"/>
           </a:p>
@@ -2179,7 +2179,7 @@
           <a:p>
             <a:fld id="{7CC7A2F6-2F19-4AE6-AE33-E09CFF174DCA}" type="datetimeFigureOut">
               <a:rPr lang="en-GB" smtClean="0"/>
-              <a:t>18/04/2018</a:t>
+              <a:t>19/04/2018</a:t>
             </a:fld>
             <a:endParaRPr lang="en-GB"/>
           </a:p>
@@ -2274,7 +2274,7 @@
           <a:p>
             <a:fld id="{7CC7A2F6-2F19-4AE6-AE33-E09CFF174DCA}" type="datetimeFigureOut">
               <a:rPr lang="en-GB" smtClean="0"/>
-              <a:t>18/04/2018</a:t>
+              <a:t>19/04/2018</a:t>
             </a:fld>
             <a:endParaRPr lang="en-GB"/>
           </a:p>
@@ -2551,7 +2551,7 @@
           <a:p>
             <a:fld id="{7CC7A2F6-2F19-4AE6-AE33-E09CFF174DCA}" type="datetimeFigureOut">
               <a:rPr lang="en-GB" smtClean="0"/>
-              <a:t>18/04/2018</a:t>
+              <a:t>19/04/2018</a:t>
             </a:fld>
             <a:endParaRPr lang="en-GB"/>
           </a:p>
@@ -2808,7 +2808,7 @@
           <a:p>
             <a:fld id="{7CC7A2F6-2F19-4AE6-AE33-E09CFF174DCA}" type="datetimeFigureOut">
               <a:rPr lang="en-GB" smtClean="0"/>
-              <a:t>18/04/2018</a:t>
+              <a:t>19/04/2018</a:t>
             </a:fld>
             <a:endParaRPr lang="en-GB"/>
           </a:p>
@@ -3021,7 +3021,7 @@
           <a:p>
             <a:fld id="{7CC7A2F6-2F19-4AE6-AE33-E09CFF174DCA}" type="datetimeFigureOut">
               <a:rPr lang="en-GB" smtClean="0"/>
-              <a:t>18/04/2018</a:t>
+              <a:t>19/04/2018</a:t>
             </a:fld>
             <a:endParaRPr lang="en-GB"/>
           </a:p>
@@ -4296,7 +4296,7 @@
           <p:cNvPr id="2" name="Title 1">
             <a:extLst>
               <a:ext uri="{FF2B5EF4-FFF2-40B4-BE49-F238E27FC236}">
-                <a16:creationId xmlns="" xmlns:a16="http://schemas.microsoft.com/office/drawing/2014/main" id="{EE6FA740-88C2-4438-BE74-8C45FDCFD8D6}"/>
+                <a16:creationId xmlns:a16="http://schemas.microsoft.com/office/drawing/2014/main" xmlns="" id="{EE6FA740-88C2-4438-BE74-8C45FDCFD8D6}"/>
               </a:ext>
             </a:extLst>
           </p:cNvPr>
@@ -4403,7 +4403,7 @@
           <p:cNvPr id="2" name="Title 1">
             <a:extLst>
               <a:ext uri="{FF2B5EF4-FFF2-40B4-BE49-F238E27FC236}">
-                <a16:creationId xmlns="" xmlns:a16="http://schemas.microsoft.com/office/drawing/2014/main" id="{EE6FA740-88C2-4438-BE74-8C45FDCFD8D6}"/>
+                <a16:creationId xmlns:a16="http://schemas.microsoft.com/office/drawing/2014/main" xmlns="" id="{EE6FA740-88C2-4438-BE74-8C45FDCFD8D6}"/>
               </a:ext>
             </a:extLst>
           </p:cNvPr>
@@ -4449,14 +4449,67 @@
         </p:blipFill>
         <p:spPr>
           <a:xfrm>
-            <a:off x="688626" y="1489752"/>
-            <a:ext cx="7826724" cy="4259948"/>
+            <a:off x="647062" y="2470251"/>
+            <a:ext cx="7868288" cy="4282570"/>
           </a:xfrm>
           <a:prstGeom prst="rect">
             <a:avLst/>
           </a:prstGeom>
         </p:spPr>
       </p:pic>
+      <p:sp>
+        <p:nvSpPr>
+          <p:cNvPr id="5" name="TextBox 4"/>
+          <p:cNvSpPr txBox="1"/>
+          <p:nvPr/>
+        </p:nvSpPr>
+        <p:spPr>
+          <a:xfrm>
+            <a:off x="744044" y="1285358"/>
+            <a:ext cx="8399956" cy="1077218"/>
+          </a:xfrm>
+          <a:prstGeom prst="rect">
+            <a:avLst/>
+          </a:prstGeom>
+          <a:noFill/>
+        </p:spPr>
+        <p:txBody>
+          <a:bodyPr wrap="square" rtlCol="0">
+            <a:spAutoFit/>
+          </a:bodyPr>
+          <a:lstStyle/>
+          <a:p>
+            <a:pPr marL="285750" indent="-285750">
+              <a:buFont typeface="Arial" charset="0"/>
+              <a:buChar char="•"/>
+            </a:pPr>
+            <a:r>
+              <a:rPr lang="en-US" sz="1600"/>
+              <a:t>THOR stands for Text-enabled Humanitarian Operations in Real Time</a:t>
+            </a:r>
+          </a:p>
+          <a:p>
+            <a:pPr marL="285750" indent="-285750">
+              <a:buFont typeface="Arial" charset="0"/>
+              <a:buChar char="•"/>
+            </a:pPr>
+            <a:r>
+              <a:rPr lang="en-US" sz="1600"/>
+              <a:t>Developed under the DARPA LORELEI program to assist in situational awareness in low-resource regions</a:t>
+            </a:r>
+          </a:p>
+          <a:p>
+            <a:pPr marL="285750" indent="-285750">
+              <a:buFont typeface="Arial" charset="0"/>
+              <a:buChar char="•"/>
+            </a:pPr>
+            <a:r>
+              <a:rPr lang="en-US" sz="1600"/>
+              <a:t>Come check out our demo on Uighyur dataset, and 2015 Nepal Earthquake Twitter dataset!</a:t>
+            </a:r>
+          </a:p>
+        </p:txBody>
+      </p:sp>
     </p:spTree>
     <p:extLst>
       <p:ext uri="{BB962C8B-B14F-4D97-AF65-F5344CB8AC3E}">
@@ -4499,7 +4552,7 @@
           <p:cNvPr id="2" name="Title 1">
             <a:extLst>
               <a:ext uri="{FF2B5EF4-FFF2-40B4-BE49-F238E27FC236}">
-                <a16:creationId xmlns="" xmlns:a16="http://schemas.microsoft.com/office/drawing/2014/main" id="{EE6FA740-88C2-4438-BE74-8C45FDCFD8D6}"/>
+                <a16:creationId xmlns:a16="http://schemas.microsoft.com/office/drawing/2014/main" xmlns="" id="{EE6FA740-88C2-4438-BE74-8C45FDCFD8D6}"/>
               </a:ext>
             </a:extLst>
           </p:cNvPr>
@@ -4629,7 +4682,7 @@
           <p:cNvPr id="2" name="Title 1">
             <a:extLst>
               <a:ext uri="{FF2B5EF4-FFF2-40B4-BE49-F238E27FC236}">
-                <a16:creationId xmlns="" xmlns:a16="http://schemas.microsoft.com/office/drawing/2014/main" id="{EE6FA740-88C2-4438-BE74-8C45FDCFD8D6}"/>
+                <a16:creationId xmlns:a16="http://schemas.microsoft.com/office/drawing/2014/main" xmlns="" id="{EE6FA740-88C2-4438-BE74-8C45FDCFD8D6}"/>
               </a:ext>
             </a:extLst>
           </p:cNvPr>
@@ -4755,7 +4808,7 @@
           <p:cNvPr id="2" name="Title 1">
             <a:extLst>
               <a:ext uri="{FF2B5EF4-FFF2-40B4-BE49-F238E27FC236}">
-                <a16:creationId xmlns="" xmlns:a16="http://schemas.microsoft.com/office/drawing/2014/main" id="{EE6FA740-88C2-4438-BE74-8C45FDCFD8D6}"/>
+                <a16:creationId xmlns:a16="http://schemas.microsoft.com/office/drawing/2014/main" xmlns="" id="{EE6FA740-88C2-4438-BE74-8C45FDCFD8D6}"/>
               </a:ext>
             </a:extLst>
           </p:cNvPr>

</xml_diff>